<commit_message>
fixed zadanie na zviko
</commit_message>
<xml_diff>
--- a/03-cvicenie/03-cvicenie.pptx
+++ b/03-cvicenie/03-cvicenie.pptx
@@ -7,12 +7,14 @@
   <p:sldIdLst>
     <p:sldId id="256" r:id="rId2"/>
     <p:sldId id="262" r:id="rId3"/>
-    <p:sldId id="263" r:id="rId4"/>
-    <p:sldId id="258" r:id="rId5"/>
-    <p:sldId id="259" r:id="rId6"/>
-    <p:sldId id="261" r:id="rId7"/>
-    <p:sldId id="264" r:id="rId8"/>
-    <p:sldId id="257" r:id="rId9"/>
+    <p:sldId id="266" r:id="rId4"/>
+    <p:sldId id="263" r:id="rId5"/>
+    <p:sldId id="258" r:id="rId6"/>
+    <p:sldId id="259" r:id="rId7"/>
+    <p:sldId id="261" r:id="rId8"/>
+    <p:sldId id="264" r:id="rId9"/>
+    <p:sldId id="265" r:id="rId10"/>
+    <p:sldId id="257" r:id="rId11"/>
   </p:sldIdLst>
   <p:sldSz cx="12192000" cy="6858000"/>
   <p:notesSz cx="6858000" cy="9144000"/>
@@ -250,7 +252,7 @@
           <a:p>
             <a:fld id="{851856AC-AD95-46EE-BC51-E8CD685BD841}" type="datetimeFigureOut">
               <a:rPr lang="sk-SK" smtClean="0"/>
-              <a:t>27.9.18</a:t>
+              <a:t>1.10.2018</a:t>
             </a:fld>
             <a:endParaRPr lang="sk-SK"/>
           </a:p>
@@ -420,7 +422,7 @@
           <a:p>
             <a:fld id="{851856AC-AD95-46EE-BC51-E8CD685BD841}" type="datetimeFigureOut">
               <a:rPr lang="sk-SK" smtClean="0"/>
-              <a:t>27.9.18</a:t>
+              <a:t>1.10.2018</a:t>
             </a:fld>
             <a:endParaRPr lang="sk-SK"/>
           </a:p>
@@ -600,7 +602,7 @@
           <a:p>
             <a:fld id="{851856AC-AD95-46EE-BC51-E8CD685BD841}" type="datetimeFigureOut">
               <a:rPr lang="sk-SK" smtClean="0"/>
-              <a:t>27.9.18</a:t>
+              <a:t>1.10.2018</a:t>
             </a:fld>
             <a:endParaRPr lang="sk-SK"/>
           </a:p>
@@ -770,7 +772,7 @@
           <a:p>
             <a:fld id="{851856AC-AD95-46EE-BC51-E8CD685BD841}" type="datetimeFigureOut">
               <a:rPr lang="sk-SK" smtClean="0"/>
-              <a:t>27.9.18</a:t>
+              <a:t>1.10.2018</a:t>
             </a:fld>
             <a:endParaRPr lang="sk-SK"/>
           </a:p>
@@ -1016,7 +1018,7 @@
           <a:p>
             <a:fld id="{851856AC-AD95-46EE-BC51-E8CD685BD841}" type="datetimeFigureOut">
               <a:rPr lang="sk-SK" smtClean="0"/>
-              <a:t>27.9.18</a:t>
+              <a:t>1.10.2018</a:t>
             </a:fld>
             <a:endParaRPr lang="sk-SK"/>
           </a:p>
@@ -1248,7 +1250,7 @@
           <a:p>
             <a:fld id="{851856AC-AD95-46EE-BC51-E8CD685BD841}" type="datetimeFigureOut">
               <a:rPr lang="sk-SK" smtClean="0"/>
-              <a:t>27.9.18</a:t>
+              <a:t>1.10.2018</a:t>
             </a:fld>
             <a:endParaRPr lang="sk-SK"/>
           </a:p>
@@ -1615,7 +1617,7 @@
           <a:p>
             <a:fld id="{851856AC-AD95-46EE-BC51-E8CD685BD841}" type="datetimeFigureOut">
               <a:rPr lang="sk-SK" smtClean="0"/>
-              <a:t>27.9.18</a:t>
+              <a:t>1.10.2018</a:t>
             </a:fld>
             <a:endParaRPr lang="sk-SK"/>
           </a:p>
@@ -1733,7 +1735,7 @@
           <a:p>
             <a:fld id="{851856AC-AD95-46EE-BC51-E8CD685BD841}" type="datetimeFigureOut">
               <a:rPr lang="sk-SK" smtClean="0"/>
-              <a:t>27.9.18</a:t>
+              <a:t>1.10.2018</a:t>
             </a:fld>
             <a:endParaRPr lang="sk-SK"/>
           </a:p>
@@ -1828,7 +1830,7 @@
           <a:p>
             <a:fld id="{851856AC-AD95-46EE-BC51-E8CD685BD841}" type="datetimeFigureOut">
               <a:rPr lang="sk-SK" smtClean="0"/>
-              <a:t>27.9.18</a:t>
+              <a:t>1.10.2018</a:t>
             </a:fld>
             <a:endParaRPr lang="sk-SK"/>
           </a:p>
@@ -2105,7 +2107,7 @@
           <a:p>
             <a:fld id="{851856AC-AD95-46EE-BC51-E8CD685BD841}" type="datetimeFigureOut">
               <a:rPr lang="sk-SK" smtClean="0"/>
-              <a:t>27.9.18</a:t>
+              <a:t>1.10.2018</a:t>
             </a:fld>
             <a:endParaRPr lang="sk-SK"/>
           </a:p>
@@ -2358,7 +2360,7 @@
           <a:p>
             <a:fld id="{851856AC-AD95-46EE-BC51-E8CD685BD841}" type="datetimeFigureOut">
               <a:rPr lang="sk-SK" smtClean="0"/>
-              <a:t>27.9.18</a:t>
+              <a:t>1.10.2018</a:t>
             </a:fld>
             <a:endParaRPr lang="sk-SK"/>
           </a:p>
@@ -2571,7 +2573,7 @@
           <a:p>
             <a:fld id="{851856AC-AD95-46EE-BC51-E8CD685BD841}" type="datetimeFigureOut">
               <a:rPr lang="sk-SK" smtClean="0"/>
-              <a:t>27.9.18</a:t>
+              <a:t>1.10.2018</a:t>
             </a:fld>
             <a:endParaRPr lang="sk-SK"/>
           </a:p>
@@ -3035,6 +3037,269 @@
 </p:sld>
 </file>
 
+<file path=ppt/slides/slide10.xml><?xml version="1.0" encoding="utf-8"?>
+<p:sld xmlns:a="http://schemas.openxmlformats.org/drawingml/2006/main" xmlns:r="http://schemas.openxmlformats.org/officeDocument/2006/relationships" xmlns:p="http://schemas.openxmlformats.org/presentationml/2006/main">
+  <p:cSld>
+    <p:spTree>
+      <p:nvGrpSpPr>
+        <p:cNvPr id="1" name=""/>
+        <p:cNvGrpSpPr/>
+        <p:nvPr/>
+      </p:nvGrpSpPr>
+      <p:grpSpPr>
+        <a:xfrm>
+          <a:off x="0" y="0"/>
+          <a:ext cx="0" cy="0"/>
+          <a:chOff x="0" y="0"/>
+          <a:chExt cx="0" cy="0"/>
+        </a:xfrm>
+      </p:grpSpPr>
+      <p:sp>
+        <p:nvSpPr>
+          <p:cNvPr id="2" name="Title 1"/>
+          <p:cNvSpPr>
+            <a:spLocks noGrp="1"/>
+          </p:cNvSpPr>
+          <p:nvPr>
+            <p:ph type="title"/>
+          </p:nvPr>
+        </p:nvSpPr>
+        <p:spPr/>
+        <p:txBody>
+          <a:bodyPr/>
+          <a:lstStyle/>
+          <a:p>
+            <a:r>
+              <a:rPr lang="en-US" dirty="0"/>
+              <a:t>Pet projects</a:t>
+            </a:r>
+            <a:endParaRPr lang="sk-SK" dirty="0"/>
+          </a:p>
+        </p:txBody>
+      </p:sp>
+      <p:sp>
+        <p:nvSpPr>
+          <p:cNvPr id="3" name="Content Placeholder 2"/>
+          <p:cNvSpPr>
+            <a:spLocks noGrp="1"/>
+          </p:cNvSpPr>
+          <p:nvPr>
+            <p:ph idx="1"/>
+          </p:nvPr>
+        </p:nvSpPr>
+        <p:spPr/>
+        <p:txBody>
+          <a:bodyPr>
+            <a:normAutofit fontScale="70000" lnSpcReduction="20000"/>
+          </a:bodyPr>
+          <a:lstStyle/>
+          <a:p>
+            <a:r>
+              <a:rPr lang="en-US" dirty="0">
+                <a:hlinkClick r:id="rId2"/>
+              </a:rPr>
+              <a:t>https://github.com/ainthek</a:t>
+            </a:r>
+          </a:p>
+          <a:p>
+            <a:pPr lvl="1"/>
+            <a:r>
+              <a:rPr lang="en-US" dirty="0">
+                <a:hlinkClick r:id="rId2"/>
+              </a:rPr>
+              <a:t>https://github.com/ainthek/nconv</a:t>
+            </a:r>
+          </a:p>
+          <a:p>
+            <a:pPr lvl="1"/>
+            <a:r>
+              <a:rPr lang="sk-SK" dirty="0">
+                <a:hlinkClick r:id="rId2"/>
+              </a:rPr>
+              <a:t>https://github.com/ainthek/abbreviations-extractor</a:t>
+            </a:r>
+            <a:endParaRPr lang="en-US" dirty="0"/>
+          </a:p>
+          <a:p>
+            <a:pPr lvl="1"/>
+            <a:r>
+              <a:rPr lang="en-US" dirty="0">
+                <a:hlinkClick r:id="rId2"/>
+              </a:rPr>
+              <a:t>https://github.com/ainthek/bakery</a:t>
+            </a:r>
+          </a:p>
+          <a:p>
+            <a:pPr lvl="1"/>
+            <a:r>
+              <a:rPr lang="en-US" dirty="0">
+                <a:hlinkClick r:id="rId3"/>
+              </a:rPr>
+              <a:t>https://github.com/ainthek/mrequire</a:t>
+            </a:r>
+            <a:endParaRPr lang="en-US" dirty="0"/>
+          </a:p>
+          <a:p>
+            <a:pPr lvl="1"/>
+            <a:r>
+              <a:rPr lang="en-US" dirty="0">
+                <a:hlinkClick r:id="rId4"/>
+              </a:rPr>
+              <a:t>https://github.com/ainthek/video-tools</a:t>
+            </a:r>
+            <a:endParaRPr lang="en-US" dirty="0"/>
+          </a:p>
+          <a:p>
+            <a:r>
+              <a:rPr lang="en-US" dirty="0" err="1"/>
+              <a:t>Projekty</a:t>
+            </a:r>
+            <a:r>
+              <a:rPr lang="en-US" dirty="0"/>
+              <a:t> co </a:t>
+            </a:r>
+            <a:r>
+              <a:rPr lang="en-US" dirty="0" err="1"/>
+              <a:t>mna</a:t>
+            </a:r>
+            <a:r>
+              <a:rPr lang="en-US" dirty="0"/>
+              <a:t> </a:t>
+            </a:r>
+            <a:r>
+              <a:rPr lang="en-US" dirty="0" err="1"/>
+              <a:t>zaujimaju</a:t>
+            </a:r>
+            <a:r>
+              <a:rPr lang="en-US" dirty="0"/>
+              <a:t>:</a:t>
+            </a:r>
+          </a:p>
+          <a:p>
+            <a:pPr lvl="1"/>
+            <a:r>
+              <a:rPr lang="en-US" dirty="0">
+                <a:hlinkClick r:id="rId5"/>
+              </a:rPr>
+              <a:t>https://github.com/kucherenko/jscpd</a:t>
+            </a:r>
+            <a:endParaRPr lang="en-US" dirty="0"/>
+          </a:p>
+          <a:p>
+            <a:pPr lvl="1"/>
+            <a:r>
+              <a:rPr lang="en-US" dirty="0">
+                <a:hlinkClick r:id="rId6"/>
+              </a:rPr>
+              <a:t>https://github.com/ainthek/plato-reports</a:t>
+            </a:r>
+            <a:endParaRPr lang="en-US" dirty="0"/>
+          </a:p>
+          <a:p>
+            <a:r>
+              <a:rPr lang="en-US" dirty="0" err="1"/>
+              <a:t>Projekty</a:t>
+            </a:r>
+            <a:r>
+              <a:rPr lang="en-US" dirty="0"/>
+              <a:t> z </a:t>
+            </a:r>
+            <a:r>
+              <a:rPr lang="en-US" dirty="0" err="1"/>
+              <a:t>vasich</a:t>
+            </a:r>
+            <a:r>
+              <a:rPr lang="en-US" dirty="0"/>
+              <a:t> </a:t>
+            </a:r>
+            <a:r>
+              <a:rPr lang="en-US" dirty="0" err="1"/>
+              <a:t>zadani</a:t>
+            </a:r>
+            <a:endParaRPr lang="en-US" dirty="0"/>
+          </a:p>
+          <a:p>
+            <a:r>
+              <a:rPr lang="en-US" dirty="0"/>
+              <a:t>Missing node.js libs</a:t>
+            </a:r>
+          </a:p>
+          <a:p>
+            <a:pPr lvl="1"/>
+            <a:r>
+              <a:rPr lang="en-US" dirty="0"/>
+              <a:t>html</a:t>
+            </a:r>
+          </a:p>
+          <a:p>
+            <a:pPr lvl="1"/>
+            <a:r>
+              <a:rPr lang="en-US" dirty="0"/>
+              <a:t>mail</a:t>
+            </a:r>
+          </a:p>
+          <a:p>
+            <a:pPr lvl="1"/>
+            <a:r>
+              <a:rPr lang="en-US" dirty="0" err="1"/>
+              <a:t>json,yaml</a:t>
+            </a:r>
+            <a:r>
+              <a:rPr lang="en-US" dirty="0"/>
+              <a:t>, …</a:t>
+            </a:r>
+          </a:p>
+          <a:p>
+            <a:pPr lvl="1"/>
+            <a:r>
+              <a:rPr lang="en-US" dirty="0"/>
+              <a:t>xml</a:t>
+            </a:r>
+          </a:p>
+          <a:p>
+            <a:pPr lvl="1"/>
+            <a:r>
+              <a:rPr lang="en-US" dirty="0" err="1"/>
+              <a:t>xlsx</a:t>
+            </a:r>
+            <a:r>
+              <a:rPr lang="en-US" dirty="0"/>
+              <a:t>, csv, </a:t>
+            </a:r>
+            <a:r>
+              <a:rPr lang="en-US" dirty="0" err="1"/>
+              <a:t>odt</a:t>
+            </a:r>
+            <a:r>
+              <a:rPr lang="en-US" dirty="0"/>
+              <a:t>….</a:t>
+            </a:r>
+          </a:p>
+          <a:p>
+            <a:pPr lvl="1"/>
+            <a:endParaRPr lang="en-US" dirty="0"/>
+          </a:p>
+          <a:p>
+            <a:endParaRPr lang="en-US" dirty="0"/>
+          </a:p>
+          <a:p>
+            <a:endParaRPr lang="sk-SK" dirty="0"/>
+          </a:p>
+        </p:txBody>
+      </p:sp>
+    </p:spTree>
+    <p:extLst>
+      <p:ext uri="{BB962C8B-B14F-4D97-AF65-F5344CB8AC3E}">
+        <p14:creationId xmlns:p14="http://schemas.microsoft.com/office/powerpoint/2010/main" val="2367517786"/>
+      </p:ext>
+    </p:extLst>
+  </p:cSld>
+  <p:clrMapOvr>
+    <a:masterClrMapping/>
+  </p:clrMapOvr>
+</p:sld>
+</file>
+
 <file path=ppt/slides/slide2.xml><?xml version="1.0" encoding="utf-8"?>
 <p:sld xmlns:a="http://schemas.openxmlformats.org/drawingml/2006/main" xmlns:r="http://schemas.openxmlformats.org/officeDocument/2006/relationships" xmlns:p="http://schemas.openxmlformats.org/presentationml/2006/main">
   <p:cSld>
@@ -3057,7 +3322,7 @@
           <p:cNvPr id="2" name="Title 1">
             <a:extLst>
               <a:ext uri="{FF2B5EF4-FFF2-40B4-BE49-F238E27FC236}">
-                <a16:creationId xmlns:a16="http://schemas.microsoft.com/office/drawing/2014/main" id="{3579F762-1F54-6A48-9DE6-53C945AD4CA9}"/>
+                <a16:creationId xmlns:a16="http://schemas.microsoft.com/office/drawing/2014/main" xmlns="" id="{3579F762-1F54-6A48-9DE6-53C945AD4CA9}"/>
               </a:ext>
             </a:extLst>
           </p:cNvPr>
@@ -3085,7 +3350,7 @@
           <p:cNvPr id="3" name="Content Placeholder 2">
             <a:extLst>
               <a:ext uri="{FF2B5EF4-FFF2-40B4-BE49-F238E27FC236}">
-                <a16:creationId xmlns:a16="http://schemas.microsoft.com/office/drawing/2014/main" id="{EA18972A-BF6E-8D45-AAF4-836A36EB033C}"/>
+                <a16:creationId xmlns:a16="http://schemas.microsoft.com/office/drawing/2014/main" xmlns="" id="{EA18972A-BF6E-8D45-AAF4-836A36EB033C}"/>
               </a:ext>
             </a:extLst>
           </p:cNvPr>
@@ -3102,56 +3367,137 @@
           <a:lstStyle/>
           <a:p>
             <a:r>
-              <a:rPr lang="sk-SK"/>
+              <a:rPr lang="sk-SK" dirty="0"/>
               <a:t>Kontrola zadani z minuleho cvika (a skupina), b skupina je obodovana</a:t>
             </a:r>
           </a:p>
           <a:p>
             <a:r>
-              <a:rPr lang="sk-SK"/>
+              <a:rPr lang="sk-SK" dirty="0">
+                <a:solidFill>
+                  <a:srgbClr val="FF0000"/>
+                </a:solidFill>
+              </a:rPr>
               <a:t>Styly kodov z prednasky na node.js FileSystem API</a:t>
             </a:r>
           </a:p>
           <a:p>
             <a:pPr lvl="1"/>
             <a:r>
-              <a:rPr lang="sk-SK"/>
+              <a:rPr lang="sk-SK" dirty="0">
+                <a:solidFill>
+                  <a:srgbClr val="FF0000"/>
+                </a:solidFill>
+              </a:rPr>
               <a:t>6 bodov</a:t>
             </a:r>
           </a:p>
           <a:p>
             <a:r>
-              <a:rPr lang="sk-SK"/>
+              <a:rPr lang="sk-SK" dirty="0">
+                <a:solidFill>
+                  <a:srgbClr val="FF0000"/>
+                </a:solidFill>
+              </a:rPr>
               <a:t>OO programming</a:t>
             </a:r>
           </a:p>
           <a:p>
             <a:pPr lvl="1"/>
             <a:r>
-              <a:rPr lang="sk-SK"/>
-              <a:t>2 body</a:t>
-            </a:r>
-          </a:p>
-          <a:p>
-            <a:r>
-              <a:rPr lang="sk-SK"/>
+              <a:rPr lang="sk-SK" dirty="0">
+                <a:solidFill>
+                  <a:srgbClr val="FF0000"/>
+                </a:solidFill>
+              </a:rPr>
+              <a:t>2 </a:t>
+            </a:r>
+            <a:r>
+              <a:rPr lang="sk-SK" dirty="0" smtClean="0">
+                <a:solidFill>
+                  <a:srgbClr val="FF0000"/>
+                </a:solidFill>
+              </a:rPr>
+              <a:t>body</a:t>
+            </a:r>
+            <a:endParaRPr lang="en-US" dirty="0">
+              <a:solidFill>
+                <a:srgbClr val="FF0000"/>
+              </a:solidFill>
+            </a:endParaRPr>
+          </a:p>
+          <a:p>
+            <a:r>
+              <a:rPr lang="en-US" dirty="0" smtClean="0">
+                <a:solidFill>
+                  <a:schemeClr val="accent6"/>
+                </a:solidFill>
+              </a:rPr>
+              <a:t>9b </a:t>
+            </a:r>
+            <a:r>
+              <a:rPr lang="en-US" dirty="0" err="1" smtClean="0">
+                <a:solidFill>
+                  <a:schemeClr val="accent6"/>
+                </a:solidFill>
+              </a:rPr>
+              <a:t>za</a:t>
+            </a:r>
+            <a:r>
+              <a:rPr lang="en-US" dirty="0" smtClean="0">
+                <a:solidFill>
+                  <a:schemeClr val="accent6"/>
+                </a:solidFill>
+              </a:rPr>
+              <a:t> </a:t>
+            </a:r>
+            <a:r>
+              <a:rPr lang="en-US" dirty="0" err="1" smtClean="0">
+                <a:solidFill>
+                  <a:schemeClr val="accent6"/>
+                </a:solidFill>
+              </a:rPr>
+              <a:t>cvicenie</a:t>
+            </a:r>
+            <a:endParaRPr lang="sk-SK" dirty="0">
+              <a:solidFill>
+                <a:schemeClr val="accent6"/>
+              </a:solidFill>
+            </a:endParaRPr>
+          </a:p>
+          <a:p>
+            <a:r>
+              <a:rPr lang="sk-SK" dirty="0"/>
               <a:t>node.js API – materialy a vysvetlenie</a:t>
             </a:r>
           </a:p>
           <a:p>
             <a:r>
-              <a:rPr lang="sk-SK"/>
+              <a:rPr lang="sk-SK" dirty="0"/>
               <a:t>mocha async testy vysvetlenie</a:t>
             </a:r>
           </a:p>
           <a:p>
             <a:r>
-              <a:rPr lang="sk-SK"/>
-              <a:t>pet projects – bonusove ulogy</a:t>
-            </a:r>
-          </a:p>
-          <a:p>
-            <a:endParaRPr lang="sk-SK"/>
+              <a:rPr lang="sk-SK" dirty="0"/>
+              <a:t>pet projects – bonusove </a:t>
+            </a:r>
+            <a:r>
+              <a:rPr lang="sk-SK" dirty="0" smtClean="0"/>
+              <a:t>ulo</a:t>
+            </a:r>
+            <a:r>
+              <a:rPr lang="en-US" dirty="0" smtClean="0"/>
+              <a:t>h</a:t>
+            </a:r>
+            <a:r>
+              <a:rPr lang="sk-SK" dirty="0" smtClean="0"/>
+              <a:t>y</a:t>
+            </a:r>
+            <a:endParaRPr lang="sk-SK" dirty="0"/>
+          </a:p>
+          <a:p>
+            <a:endParaRPr lang="sk-SK" dirty="0"/>
           </a:p>
         </p:txBody>
       </p:sp>
@@ -3187,13 +3533,7 @@
       </p:grpSpPr>
       <p:sp>
         <p:nvSpPr>
-          <p:cNvPr id="2" name="Title 1">
-            <a:extLst>
-              <a:ext uri="{FF2B5EF4-FFF2-40B4-BE49-F238E27FC236}">
-                <a16:creationId xmlns:a16="http://schemas.microsoft.com/office/drawing/2014/main" id="{C58B4356-3160-2E4D-9A3F-7290C04C7C4E}"/>
-              </a:ext>
-            </a:extLst>
-          </p:cNvPr>
+          <p:cNvPr id="2" name="Title 1"/>
           <p:cNvSpPr>
             <a:spLocks noGrp="1"/>
           </p:cNvSpPr>
@@ -3207,21 +3547,24 @@
           <a:lstStyle/>
           <a:p>
             <a:r>
-              <a:rPr lang="sk-SK"/>
-              <a:t>node.js Filesystem API</a:t>
-            </a:r>
-          </a:p>
-        </p:txBody>
-      </p:sp>
-      <p:sp>
-        <p:nvSpPr>
-          <p:cNvPr id="3" name="Content Placeholder 2">
-            <a:extLst>
-              <a:ext uri="{FF2B5EF4-FFF2-40B4-BE49-F238E27FC236}">
-                <a16:creationId xmlns:a16="http://schemas.microsoft.com/office/drawing/2014/main" id="{7789A7DC-316C-EB44-9863-E81AED697730}"/>
-              </a:ext>
-            </a:extLst>
-          </p:cNvPr>
+              <a:rPr lang="en-US" dirty="0" smtClean="0">
+                <a:solidFill>
+                  <a:schemeClr val="accent6"/>
+                </a:solidFill>
+              </a:rPr>
+              <a:t>flat(o) 4b</a:t>
+            </a:r>
+            <a:endParaRPr lang="sk-SK" dirty="0">
+              <a:solidFill>
+                <a:schemeClr val="accent6"/>
+              </a:solidFill>
+            </a:endParaRPr>
+          </a:p>
+        </p:txBody>
+      </p:sp>
+      <p:sp>
+        <p:nvSpPr>
+          <p:cNvPr id="3" name="Content Placeholder 2"/>
           <p:cNvSpPr>
             <a:spLocks noGrp="1"/>
           </p:cNvSpPr>
@@ -3235,16 +3578,125 @@
           <a:lstStyle/>
           <a:p>
             <a:r>
-              <a:rPr lang="sk-SK"/>
-              <a:t>01-prednaska/node-core-modules.pptx</a:t>
-            </a:r>
+              <a:rPr lang="en-US" dirty="0" err="1" smtClean="0"/>
+              <a:t>Implementujte</a:t>
+            </a:r>
+            <a:r>
+              <a:rPr lang="en-US" dirty="0" smtClean="0"/>
+              <a:t> </a:t>
+            </a:r>
+            <a:r>
+              <a:rPr lang="en-US" dirty="0" err="1" smtClean="0"/>
+              <a:t>funkciu</a:t>
+            </a:r>
+            <a:r>
+              <a:rPr lang="en-US" dirty="0" smtClean="0"/>
+              <a:t> flat </a:t>
+            </a:r>
+            <a:r>
+              <a:rPr lang="en-US" dirty="0" err="1" smtClean="0"/>
+              <a:t>ktora</a:t>
+            </a:r>
+            <a:r>
+              <a:rPr lang="en-US" dirty="0" smtClean="0"/>
+              <a:t> </a:t>
+            </a:r>
+            <a:r>
+              <a:rPr lang="en-US" dirty="0" err="1" smtClean="0"/>
+              <a:t>zozmiera</a:t>
+            </a:r>
+            <a:r>
+              <a:rPr lang="en-US" dirty="0" smtClean="0"/>
+              <a:t> </a:t>
+            </a:r>
+            <a:r>
+              <a:rPr lang="en-US" dirty="0" err="1" smtClean="0"/>
+              <a:t>vseky</a:t>
+            </a:r>
+            <a:r>
+              <a:rPr lang="en-US" dirty="0" smtClean="0"/>
+              <a:t> member z prototype </a:t>
+            </a:r>
+            <a:r>
+              <a:rPr lang="en-US" dirty="0" err="1" smtClean="0"/>
+              <a:t>chainu</a:t>
+            </a:r>
+            <a:r>
+              <a:rPr lang="en-US" dirty="0" smtClean="0"/>
+              <a:t> a </a:t>
+            </a:r>
+            <a:r>
+              <a:rPr lang="en-US" dirty="0" err="1" smtClean="0"/>
+              <a:t>setne</a:t>
+            </a:r>
+            <a:r>
+              <a:rPr lang="en-US" dirty="0" smtClean="0"/>
+              <a:t> </a:t>
+            </a:r>
+            <a:r>
+              <a:rPr lang="en-US" dirty="0" err="1" smtClean="0"/>
+              <a:t>ich</a:t>
+            </a:r>
+            <a:r>
+              <a:rPr lang="en-US" dirty="0" smtClean="0"/>
+              <a:t> </a:t>
+            </a:r>
+            <a:r>
+              <a:rPr lang="en-US" dirty="0" err="1" smtClean="0"/>
+              <a:t>na</a:t>
+            </a:r>
+            <a:r>
+              <a:rPr lang="en-US" dirty="0" smtClean="0"/>
+              <a:t> object </a:t>
+            </a:r>
+            <a:r>
+              <a:rPr lang="en-US" dirty="0" err="1" smtClean="0"/>
+              <a:t>samotny</a:t>
+            </a:r>
+            <a:endParaRPr lang="en-US" dirty="0" smtClean="0"/>
+          </a:p>
+          <a:p>
+            <a:r>
+              <a:rPr lang="en-US" dirty="0" smtClean="0"/>
+              <a:t>2b </a:t>
+            </a:r>
+            <a:r>
+              <a:rPr lang="en-US" dirty="0" err="1" smtClean="0"/>
+              <a:t>za</a:t>
+            </a:r>
+            <a:r>
+              <a:rPr lang="en-US" dirty="0" smtClean="0"/>
+              <a:t> test</a:t>
+            </a:r>
+          </a:p>
+          <a:p>
+            <a:r>
+              <a:rPr lang="en-US" dirty="0" smtClean="0"/>
+              <a:t>2b </a:t>
+            </a:r>
+            <a:r>
+              <a:rPr lang="en-US" dirty="0" err="1" smtClean="0"/>
+              <a:t>za</a:t>
+            </a:r>
+            <a:r>
+              <a:rPr lang="en-US" dirty="0" smtClean="0"/>
+              <a:t> </a:t>
+            </a:r>
+            <a:r>
+              <a:rPr lang="en-US" dirty="0" err="1" smtClean="0"/>
+              <a:t>implementaciu</a:t>
+            </a:r>
+            <a:endParaRPr lang="en-US" dirty="0"/>
+          </a:p>
+          <a:p>
+            <a:endParaRPr lang="sk-SK" dirty="0"/>
           </a:p>
         </p:txBody>
       </p:sp>
     </p:spTree>
     <p:extLst>
       <p:ext uri="{BB962C8B-B14F-4D97-AF65-F5344CB8AC3E}">
-        <p14:creationId xmlns:p14="http://schemas.microsoft.com/office/powerpoint/2010/main" val="63076099"/>
+        <p14:creationId xmlns:p14="http://schemas.microsoft.com/office/powerpoint/2010/main" val="3853121921"/>
       </p:ext>
     </p:extLst>
   </p:cSld>
@@ -3276,7 +3728,7 @@
           <p:cNvPr id="2" name="Title 1">
             <a:extLst>
               <a:ext uri="{FF2B5EF4-FFF2-40B4-BE49-F238E27FC236}">
-                <a16:creationId xmlns:a16="http://schemas.microsoft.com/office/drawing/2014/main" id="{49813DEA-150B-A542-9BAF-BA1D5C201AAA}"/>
+                <a16:creationId xmlns:a16="http://schemas.microsoft.com/office/drawing/2014/main" xmlns="" id="{C58B4356-3160-2E4D-9A3F-7290C04C7C4E}"/>
               </a:ext>
             </a:extLst>
           </p:cNvPr>
@@ -3293,23 +3745,12 @@
           <a:lstStyle/>
           <a:p>
             <a:r>
-              <a:rPr lang="sk-SK"/>
-              <a:t>Zadanie 03-01 – </a:t>
-            </a:r>
-            <a:r>
-              <a:rPr lang="sk-SK" b="1"/>
-              <a:t>2body</a:t>
-            </a:r>
-            <a:r>
-              <a:rPr lang="sk-SK"/>
-              <a:t>  </a:t>
-            </a:r>
-            <a:br>
-              <a:rPr lang="sk-SK"/>
-            </a:br>
-            <a:r>
-              <a:rPr lang="sk-SK"/>
-              <a:t>error-handling-events.js</a:t>
+              <a:rPr lang="sk-SK" dirty="0">
+                <a:solidFill>
+                  <a:schemeClr val="accent6"/>
+                </a:solidFill>
+              </a:rPr>
+              <a:t>node.js Filesystem API</a:t>
             </a:r>
           </a:p>
         </p:txBody>
@@ -3319,7 +3760,128 @@
           <p:cNvPr id="3" name="Content Placeholder 2">
             <a:extLst>
               <a:ext uri="{FF2B5EF4-FFF2-40B4-BE49-F238E27FC236}">
-                <a16:creationId xmlns:a16="http://schemas.microsoft.com/office/drawing/2014/main" id="{A590A23A-B1DA-154C-A0C9-E06FEDE8F42C}"/>
+                <a16:creationId xmlns:a16="http://schemas.microsoft.com/office/drawing/2014/main" xmlns="" id="{7789A7DC-316C-EB44-9863-E81AED697730}"/>
+              </a:ext>
+            </a:extLst>
+          </p:cNvPr>
+          <p:cNvSpPr>
+            <a:spLocks noGrp="1"/>
+          </p:cNvSpPr>
+          <p:nvPr>
+            <p:ph idx="1"/>
+          </p:nvPr>
+        </p:nvSpPr>
+        <p:spPr/>
+        <p:txBody>
+          <a:bodyPr/>
+          <a:lstStyle/>
+          <a:p>
+            <a:r>
+              <a:rPr lang="sk-SK"/>
+              <a:t>01-prednaska/node-core-modules.pptx</a:t>
+            </a:r>
+          </a:p>
+        </p:txBody>
+      </p:sp>
+    </p:spTree>
+    <p:extLst>
+      <p:ext uri="{BB962C8B-B14F-4D97-AF65-F5344CB8AC3E}">
+        <p14:creationId xmlns:p14="http://schemas.microsoft.com/office/powerpoint/2010/main" val="63076099"/>
+      </p:ext>
+    </p:extLst>
+  </p:cSld>
+  <p:clrMapOvr>
+    <a:masterClrMapping/>
+  </p:clrMapOvr>
+</p:sld>
+</file>
+
+<file path=ppt/slides/slide5.xml><?xml version="1.0" encoding="utf-8"?>
+<p:sld xmlns:a="http://schemas.openxmlformats.org/drawingml/2006/main" xmlns:r="http://schemas.openxmlformats.org/officeDocument/2006/relationships" xmlns:p="http://schemas.openxmlformats.org/presentationml/2006/main">
+  <p:cSld>
+    <p:spTree>
+      <p:nvGrpSpPr>
+        <p:cNvPr id="1" name=""/>
+        <p:cNvGrpSpPr/>
+        <p:nvPr/>
+      </p:nvGrpSpPr>
+      <p:grpSpPr>
+        <a:xfrm>
+          <a:off x="0" y="0"/>
+          <a:ext cx="0" cy="0"/>
+          <a:chOff x="0" y="0"/>
+          <a:chExt cx="0" cy="0"/>
+        </a:xfrm>
+      </p:grpSpPr>
+      <p:sp>
+        <p:nvSpPr>
+          <p:cNvPr id="2" name="Title 1">
+            <a:extLst>
+              <a:ext uri="{FF2B5EF4-FFF2-40B4-BE49-F238E27FC236}">
+                <a16:creationId xmlns:a16="http://schemas.microsoft.com/office/drawing/2014/main" xmlns="" id="{49813DEA-150B-A542-9BAF-BA1D5C201AAA}"/>
+              </a:ext>
+            </a:extLst>
+          </p:cNvPr>
+          <p:cNvSpPr>
+            <a:spLocks noGrp="1"/>
+          </p:cNvSpPr>
+          <p:nvPr>
+            <p:ph type="title"/>
+          </p:nvPr>
+        </p:nvSpPr>
+        <p:spPr/>
+        <p:txBody>
+          <a:bodyPr/>
+          <a:lstStyle/>
+          <a:p>
+            <a:r>
+              <a:rPr lang="sk-SK" dirty="0">
+                <a:solidFill>
+                  <a:srgbClr val="FF0000"/>
+                </a:solidFill>
+              </a:rPr>
+              <a:t>Zadanie 03-01 – </a:t>
+            </a:r>
+            <a:r>
+              <a:rPr lang="sk-SK" b="1" dirty="0">
+                <a:solidFill>
+                  <a:srgbClr val="FF0000"/>
+                </a:solidFill>
+              </a:rPr>
+              <a:t>2body</a:t>
+            </a:r>
+            <a:r>
+              <a:rPr lang="sk-SK" dirty="0">
+                <a:solidFill>
+                  <a:srgbClr val="FF0000"/>
+                </a:solidFill>
+              </a:rPr>
+              <a:t>  </a:t>
+            </a:r>
+            <a:br>
+              <a:rPr lang="sk-SK" dirty="0">
+                <a:solidFill>
+                  <a:srgbClr val="FF0000"/>
+                </a:solidFill>
+              </a:rPr>
+            </a:br>
+            <a:r>
+              <a:rPr lang="sk-SK" dirty="0">
+                <a:solidFill>
+                  <a:srgbClr val="FF0000"/>
+                </a:solidFill>
+              </a:rPr>
+              <a:t>error-handling-events.js</a:t>
+            </a:r>
+          </a:p>
+        </p:txBody>
+      </p:sp>
+      <p:sp>
+        <p:nvSpPr>
+          <p:cNvPr id="3" name="Content Placeholder 2">
+            <a:extLst>
+              <a:ext uri="{FF2B5EF4-FFF2-40B4-BE49-F238E27FC236}">
+                <a16:creationId xmlns:a16="http://schemas.microsoft.com/office/drawing/2014/main" xmlns="" id="{A590A23A-B1DA-154C-A0C9-E06FEDE8F42C}"/>
               </a:ext>
             </a:extLst>
           </p:cNvPr>
@@ -3341,41 +3903,41 @@
           <a:lstStyle/>
           <a:p>
             <a:r>
-              <a:rPr lang="sk-SK"/>
+              <a:rPr lang="sk-SK" dirty="0"/>
               <a:t>Exploratory testing - </a:t>
             </a:r>
             <a:r>
-              <a:rPr lang="sk-SK" b="1"/>
+              <a:rPr lang="sk-SK" b="1" dirty="0"/>
               <a:t>error handling in </a:t>
             </a:r>
             <a:r>
-              <a:rPr lang="sk-SK" b="1" i="1"/>
+              <a:rPr lang="sk-SK" b="1" i="1" dirty="0"/>
               <a:t>evented paradigm</a:t>
             </a:r>
           </a:p>
           <a:p>
             <a:r>
-              <a:rPr lang="sk-SK"/>
+              <a:rPr lang="sk-SK" dirty="0"/>
               <a:t>wawjs-cvicenie03</a:t>
             </a:r>
           </a:p>
           <a:p>
             <a:r>
-              <a:rPr lang="sk-SK" b="1"/>
+              <a:rPr lang="sk-SK" b="1" dirty="0"/>
               <a:t>Cviciaci:</a:t>
             </a:r>
             <a:r>
-              <a:rPr lang="sk-SK"/>
+              <a:rPr lang="sk-SK" dirty="0"/>
               <a:t> vysvetlit async testing (done() callback)</a:t>
             </a:r>
           </a:p>
           <a:p>
             <a:r>
-              <a:rPr lang="sk-SK" b="1"/>
+              <a:rPr lang="sk-SK" b="1" dirty="0"/>
               <a:t>Studenti:</a:t>
             </a:r>
             <a:r>
-              <a:rPr lang="sk-SK"/>
+              <a:rPr lang="sk-SK" dirty="0"/>
               <a:t> spravit 3 varianty z asertami na toto: </a:t>
             </a:r>
           </a:p>
@@ -3386,7 +3948,7 @@
           <p:cNvPr id="4" name="Picture 3">
             <a:extLst>
               <a:ext uri="{FF2B5EF4-FFF2-40B4-BE49-F238E27FC236}">
-                <a16:creationId xmlns:a16="http://schemas.microsoft.com/office/drawing/2014/main" id="{64DA1A31-CB05-6D4C-8143-A810FDE82BB8}"/>
+                <a16:creationId xmlns:a16="http://schemas.microsoft.com/office/drawing/2014/main" xmlns="" id="{64DA1A31-CB05-6D4C-8143-A810FDE82BB8}"/>
               </a:ext>
             </a:extLst>
           </p:cNvPr>
@@ -3424,7 +3986,7 @@
 </p:sld>
 </file>
 
-<file path=ppt/slides/slide5.xml><?xml version="1.0" encoding="utf-8"?>
+<file path=ppt/slides/slide6.xml><?xml version="1.0" encoding="utf-8"?>
 <p:sld xmlns:a="http://schemas.openxmlformats.org/drawingml/2006/main" xmlns:r="http://schemas.openxmlformats.org/officeDocument/2006/relationships" xmlns:p="http://schemas.openxmlformats.org/presentationml/2006/main">
   <p:cSld>
     <p:spTree>
@@ -3446,7 +4008,7 @@
           <p:cNvPr id="2" name="Title 1">
             <a:extLst>
               <a:ext uri="{FF2B5EF4-FFF2-40B4-BE49-F238E27FC236}">
-                <a16:creationId xmlns:a16="http://schemas.microsoft.com/office/drawing/2014/main" id="{94220C1A-2995-2845-AB6A-9CD440B9E242}"/>
+                <a16:creationId xmlns:a16="http://schemas.microsoft.com/office/drawing/2014/main" xmlns="" id="{94220C1A-2995-2845-AB6A-9CD440B9E242}"/>
               </a:ext>
             </a:extLst>
           </p:cNvPr>
@@ -3463,15 +4025,27 @@
           <a:lstStyle/>
           <a:p>
             <a:r>
-              <a:rPr lang="sk-SK"/>
+              <a:rPr lang="sk-SK" dirty="0">
+                <a:solidFill>
+                  <a:srgbClr val="FF0000"/>
+                </a:solidFill>
+              </a:rPr>
               <a:t>Zadanie 03-02 – </a:t>
             </a:r>
             <a:r>
-              <a:rPr lang="sk-SK" b="1"/>
+              <a:rPr lang="sk-SK" b="1" dirty="0">
+                <a:solidFill>
+                  <a:srgbClr val="FF0000"/>
+                </a:solidFill>
+              </a:rPr>
               <a:t>2 body</a:t>
             </a:r>
             <a:r>
-              <a:rPr lang="sk-SK"/>
+              <a:rPr lang="sk-SK" dirty="0">
+                <a:solidFill>
+                  <a:srgbClr val="FF0000"/>
+                </a:solidFill>
+              </a:rPr>
               <a:t> - Copier.spec.js</a:t>
             </a:r>
           </a:p>
@@ -3482,7 +4056,7 @@
           <p:cNvPr id="4" name="Content Placeholder 3">
             <a:extLst>
               <a:ext uri="{FF2B5EF4-FFF2-40B4-BE49-F238E27FC236}">
-                <a16:creationId xmlns:a16="http://schemas.microsoft.com/office/drawing/2014/main" id="{38C6F391-5640-2B4C-ACC5-1C717FA421F7}"/>
+                <a16:creationId xmlns:a16="http://schemas.microsoft.com/office/drawing/2014/main" xmlns="" id="{38C6F391-5640-2B4C-ACC5-1C717FA421F7}"/>
               </a:ext>
             </a:extLst>
           </p:cNvPr>
@@ -3514,7 +4088,7 @@
           <p:cNvPr id="5" name="Content Placeholder 4">
             <a:extLst>
               <a:ext uri="{FF2B5EF4-FFF2-40B4-BE49-F238E27FC236}">
-                <a16:creationId xmlns:a16="http://schemas.microsoft.com/office/drawing/2014/main" id="{033977CD-F383-A141-BCB5-F786295F011D}"/>
+                <a16:creationId xmlns:a16="http://schemas.microsoft.com/office/drawing/2014/main" xmlns="" id="{033977CD-F383-A141-BCB5-F786295F011D}"/>
               </a:ext>
             </a:extLst>
           </p:cNvPr>
@@ -3570,7 +4144,7 @@
 </p:sld>
 </file>
 
-<file path=ppt/slides/slide6.xml><?xml version="1.0" encoding="utf-8"?>
+<file path=ppt/slides/slide7.xml><?xml version="1.0" encoding="utf-8"?>
 <p:sld xmlns:a="http://schemas.openxmlformats.org/drawingml/2006/main" xmlns:r="http://schemas.openxmlformats.org/officeDocument/2006/relationships" xmlns:p="http://schemas.openxmlformats.org/presentationml/2006/main">
   <p:cSld>
     <p:spTree>
@@ -3592,7 +4166,7 @@
           <p:cNvPr id="2" name="Title 1">
             <a:extLst>
               <a:ext uri="{FF2B5EF4-FFF2-40B4-BE49-F238E27FC236}">
-                <a16:creationId xmlns:a16="http://schemas.microsoft.com/office/drawing/2014/main" id="{94220C1A-2995-2845-AB6A-9CD440B9E242}"/>
+                <a16:creationId xmlns:a16="http://schemas.microsoft.com/office/drawing/2014/main" xmlns="" id="{94220C1A-2995-2845-AB6A-9CD440B9E242}"/>
               </a:ext>
             </a:extLst>
           </p:cNvPr>
@@ -3616,22 +4190,42 @@
           <a:lstStyle/>
           <a:p>
             <a:r>
-              <a:rPr lang="sk-SK"/>
+              <a:rPr lang="sk-SK" dirty="0">
+                <a:solidFill>
+                  <a:schemeClr val="accent6"/>
+                </a:solidFill>
+              </a:rPr>
               <a:t>Zadanie 03-03 – </a:t>
             </a:r>
             <a:r>
-              <a:rPr lang="sk-SK" b="1"/>
+              <a:rPr lang="sk-SK" b="1" dirty="0">
+                <a:solidFill>
+                  <a:schemeClr val="accent6"/>
+                </a:solidFill>
+              </a:rPr>
               <a:t>2 body</a:t>
             </a:r>
             <a:r>
-              <a:rPr lang="sk-SK"/>
+              <a:rPr lang="sk-SK" dirty="0">
+                <a:solidFill>
+                  <a:schemeClr val="accent6"/>
+                </a:solidFill>
+              </a:rPr>
               <a:t> – </a:t>
             </a:r>
             <a:br>
-              <a:rPr lang="sk-SK"/>
+              <a:rPr lang="sk-SK" dirty="0">
+                <a:solidFill>
+                  <a:schemeClr val="accent6"/>
+                </a:solidFill>
+              </a:rPr>
             </a:br>
             <a:r>
-              <a:rPr lang="sk-SK"/>
+              <a:rPr lang="sk-SK" dirty="0">
+                <a:solidFill>
+                  <a:schemeClr val="accent6"/>
+                </a:solidFill>
+              </a:rPr>
               <a:t>FIXME Copier.spec.js, Coppier.js</a:t>
             </a:r>
           </a:p>
@@ -3642,7 +4236,7 @@
           <p:cNvPr id="5" name="Content Placeholder 4">
             <a:extLst>
               <a:ext uri="{FF2B5EF4-FFF2-40B4-BE49-F238E27FC236}">
-                <a16:creationId xmlns:a16="http://schemas.microsoft.com/office/drawing/2014/main" id="{033977CD-F383-A141-BCB5-F786295F011D}"/>
+                <a16:creationId xmlns:a16="http://schemas.microsoft.com/office/drawing/2014/main" xmlns="" id="{033977CD-F383-A141-BCB5-F786295F011D}"/>
               </a:ext>
             </a:extLst>
           </p:cNvPr>
@@ -3695,7 +4289,7 @@
           <p:cNvPr id="7" name="Picture 6">
             <a:extLst>
               <a:ext uri="{FF2B5EF4-FFF2-40B4-BE49-F238E27FC236}">
-                <a16:creationId xmlns:a16="http://schemas.microsoft.com/office/drawing/2014/main" id="{38266ACE-86D8-E241-BC36-DFBD1B27ABAB}"/>
+                <a16:creationId xmlns:a16="http://schemas.microsoft.com/office/drawing/2014/main" xmlns="" id="{38266ACE-86D8-E241-BC36-DFBD1B27ABAB}"/>
               </a:ext>
             </a:extLst>
           </p:cNvPr>
@@ -3730,7 +4324,7 @@
           <p:cNvPr id="9" name="Straight Arrow Connector 8">
             <a:extLst>
               <a:ext uri="{FF2B5EF4-FFF2-40B4-BE49-F238E27FC236}">
-                <a16:creationId xmlns:a16="http://schemas.microsoft.com/office/drawing/2014/main" id="{C2958DD3-1CED-AE42-9443-3BA349C08728}"/>
+                <a16:creationId xmlns:a16="http://schemas.microsoft.com/office/drawing/2014/main" xmlns="" id="{C2958DD3-1CED-AE42-9443-3BA349C08728}"/>
               </a:ext>
             </a:extLst>
           </p:cNvPr>
@@ -3772,7 +4366,7 @@
           <p:cNvPr id="10" name="Picture 9">
             <a:extLst>
               <a:ext uri="{FF2B5EF4-FFF2-40B4-BE49-F238E27FC236}">
-                <a16:creationId xmlns:a16="http://schemas.microsoft.com/office/drawing/2014/main" id="{F04185A5-645D-6D4E-8A5A-177B383E52A5}"/>
+                <a16:creationId xmlns:a16="http://schemas.microsoft.com/office/drawing/2014/main" xmlns="" id="{F04185A5-645D-6D4E-8A5A-177B383E52A5}"/>
               </a:ext>
             </a:extLst>
           </p:cNvPr>
@@ -3810,142 +4404,6 @@
 </p:sld>
 </file>
 
-<file path=ppt/slides/slide7.xml><?xml version="1.0" encoding="utf-8"?>
-<p:sld xmlns:a="http://schemas.openxmlformats.org/drawingml/2006/main" xmlns:r="http://schemas.openxmlformats.org/officeDocument/2006/relationships" xmlns:p="http://schemas.openxmlformats.org/presentationml/2006/main">
-  <p:cSld>
-    <p:spTree>
-      <p:nvGrpSpPr>
-        <p:cNvPr id="1" name=""/>
-        <p:cNvGrpSpPr/>
-        <p:nvPr/>
-      </p:nvGrpSpPr>
-      <p:grpSpPr>
-        <a:xfrm>
-          <a:off x="0" y="0"/>
-          <a:ext cx="0" cy="0"/>
-          <a:chOff x="0" y="0"/>
-          <a:chExt cx="0" cy="0"/>
-        </a:xfrm>
-      </p:grpSpPr>
-      <p:sp>
-        <p:nvSpPr>
-          <p:cNvPr id="2" name="Title 1">
-            <a:extLst>
-              <a:ext uri="{FF2B5EF4-FFF2-40B4-BE49-F238E27FC236}">
-                <a16:creationId xmlns:a16="http://schemas.microsoft.com/office/drawing/2014/main" id="{00F671E3-9109-F641-B5F1-0382C32C2467}"/>
-              </a:ext>
-            </a:extLst>
-          </p:cNvPr>
-          <p:cNvSpPr>
-            <a:spLocks noGrp="1"/>
-          </p:cNvSpPr>
-          <p:nvPr>
-            <p:ph type="title"/>
-          </p:nvPr>
-        </p:nvSpPr>
-        <p:spPr/>
-        <p:txBody>
-          <a:bodyPr/>
-          <a:lstStyle/>
-          <a:p>
-            <a:r>
-              <a:rPr lang="sk-SK"/>
-              <a:t>Zadanie 03-04 – 2b, Copier.js with no classes </a:t>
-            </a:r>
-          </a:p>
-        </p:txBody>
-      </p:sp>
-      <p:sp>
-        <p:nvSpPr>
-          <p:cNvPr id="3" name="Content Placeholder 2">
-            <a:extLst>
-              <a:ext uri="{FF2B5EF4-FFF2-40B4-BE49-F238E27FC236}">
-                <a16:creationId xmlns:a16="http://schemas.microsoft.com/office/drawing/2014/main" id="{17B6F757-E710-3B4D-8801-8E5044A33388}"/>
-              </a:ext>
-            </a:extLst>
-          </p:cNvPr>
-          <p:cNvSpPr>
-            <a:spLocks noGrp="1"/>
-          </p:cNvSpPr>
-          <p:nvPr>
-            <p:ph sz="half" idx="1"/>
-          </p:nvPr>
-        </p:nvSpPr>
-        <p:spPr/>
-        <p:txBody>
-          <a:bodyPr>
-            <a:normAutofit lnSpcReduction="10000"/>
-          </a:bodyPr>
-          <a:lstStyle/>
-          <a:p>
-            <a:r>
-              <a:rPr lang="sk-SK"/>
-              <a:t>Reimplementujte povodny Copier.js tak aby nepouzival classes a zaroven bol EventEmitter</a:t>
-            </a:r>
-          </a:p>
-          <a:p>
-            <a:endParaRPr lang="sk-SK"/>
-          </a:p>
-          <a:p>
-            <a:r>
-              <a:rPr lang="sk-SK"/>
-              <a:t>vid prednasky o OO z dnesneho dna</a:t>
-            </a:r>
-          </a:p>
-          <a:p>
-            <a:endParaRPr lang="sk-SK"/>
-          </a:p>
-          <a:p>
-            <a:r>
-              <a:rPr lang="sk-SK"/>
-              <a:t>2b ak budu testy zelene z novym Copier2.js modulom</a:t>
-            </a:r>
-          </a:p>
-          <a:p>
-            <a:endParaRPr lang="sk-SK"/>
-          </a:p>
-        </p:txBody>
-      </p:sp>
-      <p:sp>
-        <p:nvSpPr>
-          <p:cNvPr id="4" name="Content Placeholder 3">
-            <a:extLst>
-              <a:ext uri="{FF2B5EF4-FFF2-40B4-BE49-F238E27FC236}">
-                <a16:creationId xmlns:a16="http://schemas.microsoft.com/office/drawing/2014/main" id="{5D3ECA6B-77C8-7B4C-8A4B-FB6F55F139E4}"/>
-              </a:ext>
-            </a:extLst>
-          </p:cNvPr>
-          <p:cNvSpPr>
-            <a:spLocks noGrp="1"/>
-          </p:cNvSpPr>
-          <p:nvPr>
-            <p:ph sz="half" idx="2"/>
-          </p:nvPr>
-        </p:nvSpPr>
-        <p:spPr/>
-        <p:txBody>
-          <a:bodyPr>
-            <a:normAutofit lnSpcReduction="10000"/>
-          </a:bodyPr>
-          <a:lstStyle/>
-          <a:p>
-            <a:endParaRPr lang="sk-SK"/>
-          </a:p>
-        </p:txBody>
-      </p:sp>
-    </p:spTree>
-    <p:extLst>
-      <p:ext uri="{BB962C8B-B14F-4D97-AF65-F5344CB8AC3E}">
-        <p14:creationId xmlns:p14="http://schemas.microsoft.com/office/powerpoint/2010/main" val="4183870583"/>
-      </p:ext>
-    </p:extLst>
-  </p:cSld>
-  <p:clrMapOvr>
-    <a:masterClrMapping/>
-  </p:clrMapOvr>
-</p:sld>
-</file>
-
 <file path=ppt/slides/slide8.xml><?xml version="1.0" encoding="utf-8"?>
 <p:sld xmlns:a="http://schemas.openxmlformats.org/drawingml/2006/main" xmlns:r="http://schemas.openxmlformats.org/officeDocument/2006/relationships" xmlns:p="http://schemas.openxmlformats.org/presentationml/2006/main">
   <p:cSld>
@@ -3965,7 +4423,13 @@
       </p:grpSpPr>
       <p:sp>
         <p:nvSpPr>
-          <p:cNvPr id="2" name="Title 1"/>
+          <p:cNvPr id="2" name="Title 1">
+            <a:extLst>
+              <a:ext uri="{FF2B5EF4-FFF2-40B4-BE49-F238E27FC236}">
+                <a16:creationId xmlns:a16="http://schemas.microsoft.com/office/drawing/2014/main" xmlns="" id="{00F671E3-9109-F641-B5F1-0382C32C2467}"/>
+              </a:ext>
+            </a:extLst>
+          </p:cNvPr>
           <p:cNvSpPr>
             <a:spLocks noGrp="1"/>
           </p:cNvSpPr>
@@ -3979,227 +4443,217 @@
           <a:lstStyle/>
           <a:p>
             <a:r>
+              <a:rPr lang="sk-SK" dirty="0">
+                <a:solidFill>
+                  <a:schemeClr val="accent6"/>
+                </a:solidFill>
+              </a:rPr>
+              <a:t>Zadanie 03-04 – </a:t>
+            </a:r>
+            <a:r>
+              <a:rPr lang="en-US" dirty="0" smtClean="0">
+                <a:solidFill>
+                  <a:schemeClr val="accent6"/>
+                </a:solidFill>
+              </a:rPr>
+              <a:t>3</a:t>
+            </a:r>
+            <a:r>
+              <a:rPr lang="sk-SK" dirty="0" smtClean="0">
+                <a:solidFill>
+                  <a:schemeClr val="accent6"/>
+                </a:solidFill>
+              </a:rPr>
+              <a:t>b</a:t>
+            </a:r>
+            <a:r>
+              <a:rPr lang="sk-SK" dirty="0">
+                <a:solidFill>
+                  <a:schemeClr val="accent6"/>
+                </a:solidFill>
+              </a:rPr>
+              <a:t>, Copier.js with no classes </a:t>
+            </a:r>
+          </a:p>
+        </p:txBody>
+      </p:sp>
+      <p:sp>
+        <p:nvSpPr>
+          <p:cNvPr id="3" name="Content Placeholder 2">
+            <a:extLst>
+              <a:ext uri="{FF2B5EF4-FFF2-40B4-BE49-F238E27FC236}">
+                <a16:creationId xmlns:a16="http://schemas.microsoft.com/office/drawing/2014/main" xmlns="" id="{17B6F757-E710-3B4D-8801-8E5044A33388}"/>
+              </a:ext>
+            </a:extLst>
+          </p:cNvPr>
+          <p:cNvSpPr>
+            <a:spLocks noGrp="1"/>
+          </p:cNvSpPr>
+          <p:nvPr>
+            <p:ph sz="half" idx="1"/>
+          </p:nvPr>
+        </p:nvSpPr>
+        <p:spPr/>
+        <p:txBody>
+          <a:bodyPr>
+            <a:normAutofit lnSpcReduction="10000"/>
+          </a:bodyPr>
+          <a:lstStyle/>
+          <a:p>
+            <a:r>
+              <a:rPr lang="sk-SK" dirty="0"/>
+              <a:t>Reimplementujte povodny Copier.js tak aby nepouzival classes a zaroven bol EventEmitter</a:t>
+            </a:r>
+          </a:p>
+          <a:p>
+            <a:endParaRPr lang="sk-SK" dirty="0"/>
+          </a:p>
+          <a:p>
+            <a:r>
+              <a:rPr lang="sk-SK" dirty="0"/>
+              <a:t>vid prednasky o OO z dnesneho dna</a:t>
+            </a:r>
+          </a:p>
+          <a:p>
+            <a:endParaRPr lang="sk-SK" dirty="0"/>
+          </a:p>
+          <a:p>
+            <a:r>
               <a:rPr lang="en-US" dirty="0"/>
-              <a:t>Pet projects</a:t>
-            </a:r>
+              <a:t>3</a:t>
+            </a:r>
+            <a:r>
+              <a:rPr lang="sk-SK" dirty="0" smtClean="0"/>
+              <a:t>b </a:t>
+            </a:r>
+            <a:r>
+              <a:rPr lang="sk-SK" dirty="0"/>
+              <a:t>ak budu testy zelene z novym Copier2.js modulom</a:t>
+            </a:r>
+          </a:p>
+          <a:p>
             <a:endParaRPr lang="sk-SK" dirty="0"/>
           </a:p>
         </p:txBody>
       </p:sp>
       <p:sp>
         <p:nvSpPr>
-          <p:cNvPr id="3" name="Content Placeholder 2"/>
-          <p:cNvSpPr>
-            <a:spLocks noGrp="1"/>
-          </p:cNvSpPr>
-          <p:nvPr>
-            <p:ph idx="1"/>
+          <p:cNvPr id="4" name="Content Placeholder 3">
+            <a:extLst>
+              <a:ext uri="{FF2B5EF4-FFF2-40B4-BE49-F238E27FC236}">
+                <a16:creationId xmlns:a16="http://schemas.microsoft.com/office/drawing/2014/main" xmlns="" id="{5D3ECA6B-77C8-7B4C-8A4B-FB6F55F139E4}"/>
+              </a:ext>
+            </a:extLst>
+          </p:cNvPr>
+          <p:cNvSpPr>
+            <a:spLocks noGrp="1"/>
+          </p:cNvSpPr>
+          <p:nvPr>
+            <p:ph sz="half" idx="2"/>
           </p:nvPr>
         </p:nvSpPr>
         <p:spPr/>
         <p:txBody>
           <a:bodyPr>
-            <a:normAutofit fontScale="70000" lnSpcReduction="20000"/>
+            <a:normAutofit lnSpcReduction="10000"/>
           </a:bodyPr>
           <a:lstStyle/>
           <a:p>
-            <a:r>
-              <a:rPr lang="en-US" dirty="0">
-                <a:hlinkClick r:id="rId2"/>
-              </a:rPr>
-              <a:t>https://github.com/ainthek</a:t>
-            </a:r>
-          </a:p>
-          <a:p>
-            <a:pPr lvl="1"/>
-            <a:r>
-              <a:rPr lang="en-US" dirty="0">
-                <a:hlinkClick r:id="rId2"/>
-              </a:rPr>
-              <a:t>https://github.com/ainthek/nconv</a:t>
-            </a:r>
-          </a:p>
-          <a:p>
-            <a:pPr lvl="1"/>
-            <a:r>
-              <a:rPr lang="sk-SK" dirty="0">
-                <a:hlinkClick r:id="rId2"/>
-              </a:rPr>
-              <a:t>https://github.com/ainthek/abbreviations-extractor</a:t>
-            </a:r>
-            <a:endParaRPr lang="en-US" dirty="0"/>
-          </a:p>
-          <a:p>
-            <a:pPr lvl="1"/>
-            <a:r>
-              <a:rPr lang="en-US" dirty="0">
-                <a:hlinkClick r:id="rId2"/>
-              </a:rPr>
-              <a:t>https://github.com/ainthek/bakery</a:t>
-            </a:r>
-          </a:p>
-          <a:p>
-            <a:pPr lvl="1"/>
-            <a:r>
-              <a:rPr lang="en-US" dirty="0">
-                <a:hlinkClick r:id="rId3"/>
-              </a:rPr>
-              <a:t>https://github.com/ainthek/mrequire</a:t>
-            </a:r>
-            <a:endParaRPr lang="en-US" dirty="0"/>
-          </a:p>
-          <a:p>
-            <a:pPr lvl="1"/>
-            <a:r>
-              <a:rPr lang="en-US" dirty="0">
-                <a:hlinkClick r:id="rId4"/>
-              </a:rPr>
-              <a:t>https://github.com/ainthek/video-tools</a:t>
-            </a:r>
-            <a:endParaRPr lang="en-US" dirty="0"/>
-          </a:p>
-          <a:p>
-            <a:r>
-              <a:rPr lang="en-US" dirty="0" err="1"/>
-              <a:t>Projekty</a:t>
-            </a:r>
-            <a:r>
-              <a:rPr lang="en-US" dirty="0"/>
-              <a:t> co </a:t>
-            </a:r>
-            <a:r>
-              <a:rPr lang="en-US" dirty="0" err="1"/>
-              <a:t>mna</a:t>
-            </a:r>
-            <a:r>
-              <a:rPr lang="en-US" dirty="0"/>
-              <a:t> </a:t>
-            </a:r>
-            <a:r>
-              <a:rPr lang="en-US" dirty="0" err="1"/>
-              <a:t>zaujimaju</a:t>
-            </a:r>
-            <a:r>
-              <a:rPr lang="en-US" dirty="0"/>
-              <a:t>:</a:t>
-            </a:r>
-          </a:p>
-          <a:p>
-            <a:pPr lvl="1"/>
-            <a:r>
-              <a:rPr lang="en-US" dirty="0">
-                <a:hlinkClick r:id="rId5"/>
-              </a:rPr>
-              <a:t>https://github.com/kucherenko/jscpd</a:t>
-            </a:r>
-            <a:endParaRPr lang="en-US" dirty="0"/>
-          </a:p>
-          <a:p>
-            <a:pPr lvl="1"/>
-            <a:r>
-              <a:rPr lang="en-US" dirty="0">
-                <a:hlinkClick r:id="rId6"/>
-              </a:rPr>
-              <a:t>https://github.com/ainthek/plato-reports</a:t>
-            </a:r>
-            <a:endParaRPr lang="en-US" dirty="0"/>
-          </a:p>
-          <a:p>
-            <a:r>
-              <a:rPr lang="en-US" dirty="0" err="1"/>
-              <a:t>Projekty</a:t>
-            </a:r>
-            <a:r>
-              <a:rPr lang="en-US" dirty="0"/>
-              <a:t> z </a:t>
-            </a:r>
-            <a:r>
-              <a:rPr lang="en-US" dirty="0" err="1"/>
-              <a:t>vasich</a:t>
-            </a:r>
-            <a:r>
-              <a:rPr lang="en-US" dirty="0"/>
-              <a:t> </a:t>
-            </a:r>
-            <a:r>
-              <a:rPr lang="en-US" dirty="0" err="1"/>
-              <a:t>zadani</a:t>
-            </a:r>
-            <a:endParaRPr lang="en-US" dirty="0"/>
-          </a:p>
-          <a:p>
-            <a:r>
-              <a:rPr lang="en-US" dirty="0"/>
-              <a:t>Missing node.js libs</a:t>
-            </a:r>
-          </a:p>
-          <a:p>
-            <a:pPr lvl="1"/>
-            <a:r>
-              <a:rPr lang="en-US" dirty="0"/>
-              <a:t>html</a:t>
-            </a:r>
-          </a:p>
-          <a:p>
-            <a:pPr lvl="1"/>
-            <a:r>
-              <a:rPr lang="en-US" dirty="0"/>
-              <a:t>mail</a:t>
-            </a:r>
-          </a:p>
-          <a:p>
-            <a:pPr lvl="1"/>
-            <a:r>
-              <a:rPr lang="en-US" dirty="0" err="1"/>
-              <a:t>json,yaml</a:t>
-            </a:r>
-            <a:r>
-              <a:rPr lang="en-US" dirty="0"/>
-              <a:t>, …</a:t>
-            </a:r>
-          </a:p>
-          <a:p>
-            <a:pPr lvl="1"/>
-            <a:r>
-              <a:rPr lang="en-US" dirty="0"/>
-              <a:t>xml</a:t>
-            </a:r>
-          </a:p>
-          <a:p>
-            <a:pPr lvl="1"/>
-            <a:r>
-              <a:rPr lang="en-US" dirty="0" err="1"/>
-              <a:t>xlsx</a:t>
-            </a:r>
-            <a:r>
-              <a:rPr lang="en-US" dirty="0"/>
-              <a:t>, csv, </a:t>
-            </a:r>
-            <a:r>
-              <a:rPr lang="en-US" dirty="0" err="1"/>
-              <a:t>odt</a:t>
-            </a:r>
-            <a:r>
-              <a:rPr lang="en-US"/>
-              <a:t>….</a:t>
-            </a:r>
-          </a:p>
-          <a:p>
-            <a:pPr lvl="1"/>
-            <a:endParaRPr lang="en-US" dirty="0"/>
-          </a:p>
-          <a:p>
-            <a:endParaRPr lang="en-US" dirty="0"/>
-          </a:p>
-          <a:p>
-            <a:endParaRPr lang="sk-SK" dirty="0"/>
+            <a:endParaRPr lang="sk-SK"/>
           </a:p>
         </p:txBody>
       </p:sp>
     </p:spTree>
     <p:extLst>
       <p:ext uri="{BB962C8B-B14F-4D97-AF65-F5344CB8AC3E}">
-        <p14:creationId xmlns:p14="http://schemas.microsoft.com/office/powerpoint/2010/main" val="2367517786"/>
+        <p14:creationId xmlns:p14="http://schemas.microsoft.com/office/powerpoint/2010/main" val="4183870583"/>
+      </p:ext>
+    </p:extLst>
+  </p:cSld>
+  <p:clrMapOvr>
+    <a:masterClrMapping/>
+  </p:clrMapOvr>
+</p:sld>
+</file>
+
+<file path=ppt/slides/slide9.xml><?xml version="1.0" encoding="utf-8"?>
+<p:sld xmlns:a="http://schemas.openxmlformats.org/drawingml/2006/main" xmlns:r="http://schemas.openxmlformats.org/officeDocument/2006/relationships" xmlns:p="http://schemas.openxmlformats.org/presentationml/2006/main">
+  <p:cSld>
+    <p:spTree>
+      <p:nvGrpSpPr>
+        <p:cNvPr id="1" name=""/>
+        <p:cNvGrpSpPr/>
+        <p:nvPr/>
+      </p:nvGrpSpPr>
+      <p:grpSpPr>
+        <a:xfrm>
+          <a:off x="0" y="0"/>
+          <a:ext cx="0" cy="0"/>
+          <a:chOff x="0" y="0"/>
+          <a:chExt cx="0" cy="0"/>
+        </a:xfrm>
+      </p:grpSpPr>
+      <p:sp>
+        <p:nvSpPr>
+          <p:cNvPr id="2" name="Title 1"/>
+          <p:cNvSpPr>
+            <a:spLocks noGrp="1"/>
+          </p:cNvSpPr>
+          <p:nvPr>
+            <p:ph type="title"/>
+          </p:nvPr>
+        </p:nvSpPr>
+        <p:spPr/>
+        <p:txBody>
+          <a:bodyPr/>
+          <a:lstStyle/>
+          <a:p>
+            <a:endParaRPr lang="sk-SK" dirty="0"/>
+          </a:p>
+        </p:txBody>
+      </p:sp>
+      <p:sp>
+        <p:nvSpPr>
+          <p:cNvPr id="3" name="Content Placeholder 2"/>
+          <p:cNvSpPr>
+            <a:spLocks noGrp="1"/>
+          </p:cNvSpPr>
+          <p:nvPr>
+            <p:ph sz="half" idx="1"/>
+          </p:nvPr>
+        </p:nvSpPr>
+        <p:spPr/>
+        <p:txBody>
+          <a:bodyPr/>
+          <a:lstStyle/>
+          <a:p>
+            <a:endParaRPr lang="sk-SK"/>
+          </a:p>
+        </p:txBody>
+      </p:sp>
+      <p:sp>
+        <p:nvSpPr>
+          <p:cNvPr id="4" name="Content Placeholder 3"/>
+          <p:cNvSpPr>
+            <a:spLocks noGrp="1"/>
+          </p:cNvSpPr>
+          <p:nvPr>
+            <p:ph sz="half" idx="2"/>
+          </p:nvPr>
+        </p:nvSpPr>
+        <p:spPr/>
+        <p:txBody>
+          <a:bodyPr/>
+          <a:lstStyle/>
+          <a:p>
+            <a:endParaRPr lang="sk-SK"/>
+          </a:p>
+        </p:txBody>
+      </p:sp>
+    </p:spTree>
+    <p:extLst>
+      <p:ext uri="{BB962C8B-B14F-4D97-AF65-F5344CB8AC3E}">
+        <p14:creationId xmlns:p14="http://schemas.microsoft.com/office/powerpoint/2010/main" val="1528469627"/>
       </p:ext>
     </p:extLst>
   </p:cSld>

</xml_diff>

<commit_message>
opravene zadanie na zvicenie cislo 3
</commit_message>
<xml_diff>
--- a/03-cvicenie/03-cvicenie.pptx
+++ b/03-cvicenie/03-cvicenie.pptx
@@ -3322,7 +3322,7 @@
           <p:cNvPr id="2" name="Title 1">
             <a:extLst>
               <a:ext uri="{FF2B5EF4-FFF2-40B4-BE49-F238E27FC236}">
-                <a16:creationId xmlns:a16="http://schemas.microsoft.com/office/drawing/2014/main" xmlns="" id="{3579F762-1F54-6A48-9DE6-53C945AD4CA9}"/>
+                <a16:creationId xmlns="" xmlns:a16="http://schemas.microsoft.com/office/drawing/2014/main" id="{3579F762-1F54-6A48-9DE6-53C945AD4CA9}"/>
               </a:ext>
             </a:extLst>
           </p:cNvPr>
@@ -3350,7 +3350,7 @@
           <p:cNvPr id="3" name="Content Placeholder 2">
             <a:extLst>
               <a:ext uri="{FF2B5EF4-FFF2-40B4-BE49-F238E27FC236}">
-                <a16:creationId xmlns:a16="http://schemas.microsoft.com/office/drawing/2014/main" xmlns="" id="{EA18972A-BF6E-8D45-AAF4-836A36EB033C}"/>
+                <a16:creationId xmlns="" xmlns:a16="http://schemas.microsoft.com/office/drawing/2014/main" id="{EA18972A-BF6E-8D45-AAF4-836A36EB033C}"/>
               </a:ext>
             </a:extLst>
           </p:cNvPr>
@@ -3602,8 +3602,8 @@
               <a:t> </a:t>
             </a:r>
             <a:r>
-              <a:rPr lang="en-US" dirty="0" err="1" smtClean="0"/>
-              <a:t>zozmiera</a:t>
+              <a:rPr lang="en-US" smtClean="0"/>
+              <a:t>zozbiera</a:t>
             </a:r>
             <a:r>
               <a:rPr lang="en-US" dirty="0" smtClean="0"/>
@@ -3728,7 +3728,7 @@
           <p:cNvPr id="2" name="Title 1">
             <a:extLst>
               <a:ext uri="{FF2B5EF4-FFF2-40B4-BE49-F238E27FC236}">
-                <a16:creationId xmlns:a16="http://schemas.microsoft.com/office/drawing/2014/main" xmlns="" id="{C58B4356-3160-2E4D-9A3F-7290C04C7C4E}"/>
+                <a16:creationId xmlns="" xmlns:a16="http://schemas.microsoft.com/office/drawing/2014/main" id="{C58B4356-3160-2E4D-9A3F-7290C04C7C4E}"/>
               </a:ext>
             </a:extLst>
           </p:cNvPr>
@@ -3760,7 +3760,7 @@
           <p:cNvPr id="3" name="Content Placeholder 2">
             <a:extLst>
               <a:ext uri="{FF2B5EF4-FFF2-40B4-BE49-F238E27FC236}">
-                <a16:creationId xmlns:a16="http://schemas.microsoft.com/office/drawing/2014/main" xmlns="" id="{7789A7DC-316C-EB44-9863-E81AED697730}"/>
+                <a16:creationId xmlns="" xmlns:a16="http://schemas.microsoft.com/office/drawing/2014/main" id="{7789A7DC-316C-EB44-9863-E81AED697730}"/>
               </a:ext>
             </a:extLst>
           </p:cNvPr>
@@ -3818,7 +3818,7 @@
           <p:cNvPr id="2" name="Title 1">
             <a:extLst>
               <a:ext uri="{FF2B5EF4-FFF2-40B4-BE49-F238E27FC236}">
-                <a16:creationId xmlns:a16="http://schemas.microsoft.com/office/drawing/2014/main" xmlns="" id="{49813DEA-150B-A542-9BAF-BA1D5C201AAA}"/>
+                <a16:creationId xmlns="" xmlns:a16="http://schemas.microsoft.com/office/drawing/2014/main" id="{49813DEA-150B-A542-9BAF-BA1D5C201AAA}"/>
               </a:ext>
             </a:extLst>
           </p:cNvPr>
@@ -3881,7 +3881,7 @@
           <p:cNvPr id="3" name="Content Placeholder 2">
             <a:extLst>
               <a:ext uri="{FF2B5EF4-FFF2-40B4-BE49-F238E27FC236}">
-                <a16:creationId xmlns:a16="http://schemas.microsoft.com/office/drawing/2014/main" xmlns="" id="{A590A23A-B1DA-154C-A0C9-E06FEDE8F42C}"/>
+                <a16:creationId xmlns="" xmlns:a16="http://schemas.microsoft.com/office/drawing/2014/main" id="{A590A23A-B1DA-154C-A0C9-E06FEDE8F42C}"/>
               </a:ext>
             </a:extLst>
           </p:cNvPr>
@@ -3948,7 +3948,7 @@
           <p:cNvPr id="4" name="Picture 3">
             <a:extLst>
               <a:ext uri="{FF2B5EF4-FFF2-40B4-BE49-F238E27FC236}">
-                <a16:creationId xmlns:a16="http://schemas.microsoft.com/office/drawing/2014/main" xmlns="" id="{64DA1A31-CB05-6D4C-8143-A810FDE82BB8}"/>
+                <a16:creationId xmlns="" xmlns:a16="http://schemas.microsoft.com/office/drawing/2014/main" id="{64DA1A31-CB05-6D4C-8143-A810FDE82BB8}"/>
               </a:ext>
             </a:extLst>
           </p:cNvPr>
@@ -4008,7 +4008,7 @@
           <p:cNvPr id="2" name="Title 1">
             <a:extLst>
               <a:ext uri="{FF2B5EF4-FFF2-40B4-BE49-F238E27FC236}">
-                <a16:creationId xmlns:a16="http://schemas.microsoft.com/office/drawing/2014/main" xmlns="" id="{94220C1A-2995-2845-AB6A-9CD440B9E242}"/>
+                <a16:creationId xmlns="" xmlns:a16="http://schemas.microsoft.com/office/drawing/2014/main" id="{94220C1A-2995-2845-AB6A-9CD440B9E242}"/>
               </a:ext>
             </a:extLst>
           </p:cNvPr>
@@ -4056,7 +4056,7 @@
           <p:cNvPr id="4" name="Content Placeholder 3">
             <a:extLst>
               <a:ext uri="{FF2B5EF4-FFF2-40B4-BE49-F238E27FC236}">
-                <a16:creationId xmlns:a16="http://schemas.microsoft.com/office/drawing/2014/main" xmlns="" id="{38C6F391-5640-2B4C-ACC5-1C717FA421F7}"/>
+                <a16:creationId xmlns="" xmlns:a16="http://schemas.microsoft.com/office/drawing/2014/main" id="{38C6F391-5640-2B4C-ACC5-1C717FA421F7}"/>
               </a:ext>
             </a:extLst>
           </p:cNvPr>
@@ -4088,7 +4088,7 @@
           <p:cNvPr id="5" name="Content Placeholder 4">
             <a:extLst>
               <a:ext uri="{FF2B5EF4-FFF2-40B4-BE49-F238E27FC236}">
-                <a16:creationId xmlns:a16="http://schemas.microsoft.com/office/drawing/2014/main" xmlns="" id="{033977CD-F383-A141-BCB5-F786295F011D}"/>
+                <a16:creationId xmlns="" xmlns:a16="http://schemas.microsoft.com/office/drawing/2014/main" id="{033977CD-F383-A141-BCB5-F786295F011D}"/>
               </a:ext>
             </a:extLst>
           </p:cNvPr>
@@ -4166,7 +4166,7 @@
           <p:cNvPr id="2" name="Title 1">
             <a:extLst>
               <a:ext uri="{FF2B5EF4-FFF2-40B4-BE49-F238E27FC236}">
-                <a16:creationId xmlns:a16="http://schemas.microsoft.com/office/drawing/2014/main" xmlns="" id="{94220C1A-2995-2845-AB6A-9CD440B9E242}"/>
+                <a16:creationId xmlns="" xmlns:a16="http://schemas.microsoft.com/office/drawing/2014/main" id="{94220C1A-2995-2845-AB6A-9CD440B9E242}"/>
               </a:ext>
             </a:extLst>
           </p:cNvPr>
@@ -4236,7 +4236,7 @@
           <p:cNvPr id="5" name="Content Placeholder 4">
             <a:extLst>
               <a:ext uri="{FF2B5EF4-FFF2-40B4-BE49-F238E27FC236}">
-                <a16:creationId xmlns:a16="http://schemas.microsoft.com/office/drawing/2014/main" xmlns="" id="{033977CD-F383-A141-BCB5-F786295F011D}"/>
+                <a16:creationId xmlns="" xmlns:a16="http://schemas.microsoft.com/office/drawing/2014/main" id="{033977CD-F383-A141-BCB5-F786295F011D}"/>
               </a:ext>
             </a:extLst>
           </p:cNvPr>
@@ -4289,7 +4289,7 @@
           <p:cNvPr id="7" name="Picture 6">
             <a:extLst>
               <a:ext uri="{FF2B5EF4-FFF2-40B4-BE49-F238E27FC236}">
-                <a16:creationId xmlns:a16="http://schemas.microsoft.com/office/drawing/2014/main" xmlns="" id="{38266ACE-86D8-E241-BC36-DFBD1B27ABAB}"/>
+                <a16:creationId xmlns="" xmlns:a16="http://schemas.microsoft.com/office/drawing/2014/main" id="{38266ACE-86D8-E241-BC36-DFBD1B27ABAB}"/>
               </a:ext>
             </a:extLst>
           </p:cNvPr>
@@ -4324,7 +4324,7 @@
           <p:cNvPr id="9" name="Straight Arrow Connector 8">
             <a:extLst>
               <a:ext uri="{FF2B5EF4-FFF2-40B4-BE49-F238E27FC236}">
-                <a16:creationId xmlns:a16="http://schemas.microsoft.com/office/drawing/2014/main" xmlns="" id="{C2958DD3-1CED-AE42-9443-3BA349C08728}"/>
+                <a16:creationId xmlns="" xmlns:a16="http://schemas.microsoft.com/office/drawing/2014/main" id="{C2958DD3-1CED-AE42-9443-3BA349C08728}"/>
               </a:ext>
             </a:extLst>
           </p:cNvPr>
@@ -4366,7 +4366,7 @@
           <p:cNvPr id="10" name="Picture 9">
             <a:extLst>
               <a:ext uri="{FF2B5EF4-FFF2-40B4-BE49-F238E27FC236}">
-                <a16:creationId xmlns:a16="http://schemas.microsoft.com/office/drawing/2014/main" xmlns="" id="{F04185A5-645D-6D4E-8A5A-177B383E52A5}"/>
+                <a16:creationId xmlns="" xmlns:a16="http://schemas.microsoft.com/office/drawing/2014/main" id="{F04185A5-645D-6D4E-8A5A-177B383E52A5}"/>
               </a:ext>
             </a:extLst>
           </p:cNvPr>
@@ -4426,7 +4426,7 @@
           <p:cNvPr id="2" name="Title 1">
             <a:extLst>
               <a:ext uri="{FF2B5EF4-FFF2-40B4-BE49-F238E27FC236}">
-                <a16:creationId xmlns:a16="http://schemas.microsoft.com/office/drawing/2014/main" xmlns="" id="{00F671E3-9109-F641-B5F1-0382C32C2467}"/>
+                <a16:creationId xmlns="" xmlns:a16="http://schemas.microsoft.com/office/drawing/2014/main" id="{00F671E3-9109-F641-B5F1-0382C32C2467}"/>
               </a:ext>
             </a:extLst>
           </p:cNvPr>
@@ -4482,7 +4482,7 @@
           <p:cNvPr id="3" name="Content Placeholder 2">
             <a:extLst>
               <a:ext uri="{FF2B5EF4-FFF2-40B4-BE49-F238E27FC236}">
-                <a16:creationId xmlns:a16="http://schemas.microsoft.com/office/drawing/2014/main" xmlns="" id="{17B6F757-E710-3B4D-8801-8E5044A33388}"/>
+                <a16:creationId xmlns="" xmlns:a16="http://schemas.microsoft.com/office/drawing/2014/main" id="{17B6F757-E710-3B4D-8801-8E5044A33388}"/>
               </a:ext>
             </a:extLst>
           </p:cNvPr>
@@ -4541,7 +4541,7 @@
           <p:cNvPr id="4" name="Content Placeholder 3">
             <a:extLst>
               <a:ext uri="{FF2B5EF4-FFF2-40B4-BE49-F238E27FC236}">
-                <a16:creationId xmlns:a16="http://schemas.microsoft.com/office/drawing/2014/main" xmlns="" id="{5D3ECA6B-77C8-7B4C-8A4B-FB6F55F139E4}"/>
+                <a16:creationId xmlns="" xmlns:a16="http://schemas.microsoft.com/office/drawing/2014/main" id="{5D3ECA6B-77C8-7B4C-8A4B-FB6F55F139E4}"/>
               </a:ext>
             </a:extLst>
           </p:cNvPr>

</xml_diff>